<commit_message>
last update for presentation
</commit_message>
<xml_diff>
--- a/jessica.besagni/projects/Subtitles 2605.pptx
+++ b/jessica.besagni/projects/Subtitles 2605.pptx
@@ -8,7 +8,8 @@
     <p:sldId id="256" r:id="rId2"/>
     <p:sldId id="263" r:id="rId3"/>
     <p:sldId id="264" r:id="rId4"/>
-    <p:sldId id="262" r:id="rId5"/>
+    <p:sldId id="265" r:id="rId5"/>
+    <p:sldId id="262" r:id="rId6"/>
   </p:sldIdLst>
   <p:sldSz cx="9144000" cy="6858000" type="screen4x3"/>
   <p:notesSz cx="6858000" cy="9144000"/>
@@ -5304,6 +5305,14 @@
             </a:r>
             <a:r>
               <a:rPr lang="fr-FR" dirty="0" err="1" smtClean="0"/>
+              <a:t>grep</a:t>
+            </a:r>
+            <a:r>
+              <a:rPr lang="fr-FR" dirty="0" smtClean="0"/>
+              <a:t> and </a:t>
+            </a:r>
+            <a:r>
+              <a:rPr lang="fr-FR" dirty="0" err="1" smtClean="0"/>
               <a:t>sed</a:t>
             </a:r>
             <a:r>
@@ -5316,7 +5325,65 @@
               <a:buNone/>
             </a:pPr>
             <a:r>
-              <a:rPr lang="fr-FR" dirty="0" smtClean="0"/>
+              <a:rPr lang="fr-FR" b="1" smtClean="0"/>
+              <a:t>	grep</a:t>
+            </a:r>
+            <a:r>
+              <a:rPr lang="fr-FR" b="1" dirty="0" smtClean="0"/>
+              <a:t> </a:t>
+            </a:r>
+            <a:r>
+              <a:rPr lang="fr-FR" b="1" dirty="0"/>
+              <a:t>-o '&lt;a </a:t>
+            </a:r>
+            <a:r>
+              <a:rPr lang="fr-FR" b="1" dirty="0" err="1"/>
+              <a:t>href</a:t>
+            </a:r>
+            <a:r>
+              <a:rPr lang="fr-FR" b="1" dirty="0"/>
+              <a:t>="/</a:t>
+            </a:r>
+            <a:r>
+              <a:rPr lang="fr-FR" b="1" dirty="0" err="1"/>
+              <a:t>fr</a:t>
+            </a:r>
+            <a:r>
+              <a:rPr lang="fr-FR" b="1" dirty="0"/>
+              <a:t>/</a:t>
+            </a:r>
+            <a:r>
+              <a:rPr lang="fr-FR" b="1" dirty="0" err="1"/>
+              <a:t>subtitleserve</a:t>
+            </a:r>
+            <a:r>
+              <a:rPr lang="fr-FR" b="1" dirty="0"/>
+              <a:t>/</a:t>
+            </a:r>
+            <a:r>
+              <a:rPr lang="fr-FR" b="1" dirty="0" err="1"/>
+              <a:t>sub</a:t>
+            </a:r>
+            <a:r>
+              <a:rPr lang="fr-FR" b="1" dirty="0"/>
+              <a:t>/[^"]</a:t>
+            </a:r>
+            <a:r>
+              <a:rPr lang="fr-FR" b="1" dirty="0" smtClean="0"/>
+              <a:t>*' </a:t>
+            </a:r>
+            <a:r>
+              <a:rPr lang="fr-FR" b="1" dirty="0"/>
+              <a:t>| </a:t>
+            </a:r>
+            <a:endParaRPr lang="fr-FR" b="1" dirty="0" smtClean="0"/>
+          </a:p>
+          <a:p>
+            <a:pPr marL="0" indent="0">
+              <a:buNone/>
+            </a:pPr>
+            <a:r>
+              <a:rPr lang="fr-FR" b="1" dirty="0"/>
               <a:t>	</a:t>
             </a:r>
             <a:r>
@@ -5353,7 +5420,15 @@
             </a:r>
             <a:r>
               <a:rPr lang="fr-FR" b="1" dirty="0"/>
-              <a:t>\///;s/"$//')</a:t>
+              <a:t>\//</a:t>
+            </a:r>
+            <a:r>
+              <a:rPr lang="fr-FR" b="1" dirty="0" smtClean="0"/>
+              <a:t>/'</a:t>
+            </a:r>
+            <a:r>
+              <a:rPr lang="fr-FR" b="1" dirty="0"/>
+              <a:t>);</a:t>
             </a:r>
           </a:p>
         </p:txBody>
@@ -5437,9 +5512,16 @@
             <p:ph idx="1"/>
           </p:nvPr>
         </p:nvSpPr>
-        <p:spPr/>
-        <p:txBody>
-          <a:bodyPr/>
+        <p:spPr>
+          <a:xfrm>
+            <a:off x="877949" y="2273588"/>
+            <a:ext cx="7846951" cy="3992742"/>
+          </a:xfrm>
+        </p:spPr>
+        <p:txBody>
+          <a:bodyPr>
+            <a:normAutofit/>
+          </a:bodyPr>
           <a:lstStyle/>
           <a:p>
             <a:r>
@@ -5458,7 +5540,94 @@
               <a:rPr lang="fr-FR" dirty="0" smtClean="0"/>
               <a:t> by default</a:t>
             </a:r>
-            <a:endParaRPr lang="fr-FR" dirty="0"/>
+          </a:p>
+          <a:p>
+            <a:pPr marL="0" indent="0">
+              <a:buNone/>
+            </a:pPr>
+            <a:r>
+              <a:rPr lang="fr-FR" b="1" dirty="0" smtClean="0"/>
+              <a:t>	</a:t>
+            </a:r>
+            <a:r>
+              <a:rPr lang="fr-FR" b="1" dirty="0" err="1" smtClean="0"/>
+              <a:t>lang</a:t>
+            </a:r>
+            <a:r>
+              <a:rPr lang="fr-FR" b="1" dirty="0"/>
+              <a:t>="</a:t>
+            </a:r>
+            <a:r>
+              <a:rPr lang="fr-FR" b="1" dirty="0" err="1"/>
+              <a:t>fre</a:t>
+            </a:r>
+            <a:r>
+              <a:rPr lang="fr-FR" b="1" dirty="0"/>
+              <a:t>"</a:t>
+            </a:r>
+            <a:endParaRPr lang="fr-FR" b="1" dirty="0" smtClean="0"/>
+          </a:p>
+          <a:p>
+            <a:r>
+              <a:rPr lang="fr-FR" dirty="0" err="1" smtClean="0"/>
+              <a:t>Verification</a:t>
+            </a:r>
+            <a:r>
+              <a:rPr lang="fr-FR" dirty="0" smtClean="0"/>
+              <a:t> </a:t>
+            </a:r>
+            <a:r>
+              <a:rPr lang="fr-FR" dirty="0" err="1" smtClean="0"/>
+              <a:t>that</a:t>
+            </a:r>
+            <a:r>
+              <a:rPr lang="fr-FR" dirty="0" smtClean="0"/>
+              <a:t> a </a:t>
+            </a:r>
+            <a:r>
+              <a:rPr lang="fr-FR" dirty="0" err="1" smtClean="0"/>
+              <a:t>parameter</a:t>
+            </a:r>
+            <a:r>
+              <a:rPr lang="fr-FR" dirty="0" smtClean="0"/>
+              <a:t> </a:t>
+            </a:r>
+            <a:r>
+              <a:rPr lang="fr-FR" dirty="0" err="1" smtClean="0"/>
+              <a:t>is</a:t>
+            </a:r>
+            <a:r>
+              <a:rPr lang="fr-FR" dirty="0" smtClean="0"/>
+              <a:t> </a:t>
+            </a:r>
+            <a:r>
+              <a:rPr lang="fr-FR" dirty="0" err="1" smtClean="0"/>
+              <a:t>entered</a:t>
+            </a:r>
+            <a:endParaRPr lang="fr-FR" dirty="0" smtClean="0"/>
+          </a:p>
+          <a:p>
+            <a:pPr marL="0" indent="0">
+              <a:buNone/>
+            </a:pPr>
+            <a:r>
+              <a:rPr lang="fr-FR" dirty="0" smtClean="0"/>
+              <a:t>	</a:t>
+            </a:r>
+            <a:r>
+              <a:rPr lang="en-US" b="1" dirty="0"/>
+              <a:t>if [[ $# != 0 ]] ; </a:t>
+            </a:r>
+            <a:r>
+              <a:rPr lang="en-US" b="1" dirty="0" smtClean="0"/>
+              <a:t>then</a:t>
+            </a:r>
+          </a:p>
+          <a:p>
+            <a:pPr marL="0" indent="0">
+              <a:buNone/>
+            </a:pPr>
+            <a:endParaRPr lang="fr-FR" b="1" dirty="0"/>
           </a:p>
         </p:txBody>
       </p:sp>
@@ -5508,6 +5677,262 @@
           <a:lstStyle/>
           <a:p>
             <a:r>
+              <a:rPr lang="fr-FR" dirty="0" err="1" smtClean="0"/>
+              <a:t>What</a:t>
+            </a:r>
+            <a:r>
+              <a:rPr lang="fr-FR" dirty="0" smtClean="0"/>
+              <a:t> </a:t>
+            </a:r>
+            <a:r>
+              <a:rPr lang="fr-FR" dirty="0" err="1" smtClean="0"/>
+              <a:t>we</a:t>
+            </a:r>
+            <a:r>
+              <a:rPr lang="fr-FR" dirty="0" smtClean="0"/>
+              <a:t> have </a:t>
+            </a:r>
+            <a:r>
+              <a:rPr lang="fr-FR" dirty="0" err="1" smtClean="0"/>
+              <a:t>done</a:t>
+            </a:r>
+            <a:endParaRPr lang="fr-FR" dirty="0"/>
+          </a:p>
+        </p:txBody>
+      </p:sp>
+      <p:sp>
+        <p:nvSpPr>
+          <p:cNvPr id="3" name="Espace réservé du contenu 2"/>
+          <p:cNvSpPr>
+            <a:spLocks noGrp="1"/>
+          </p:cNvSpPr>
+          <p:nvPr>
+            <p:ph idx="1"/>
+          </p:nvPr>
+        </p:nvSpPr>
+        <p:spPr>
+          <a:xfrm>
+            <a:off x="846629" y="2360618"/>
+            <a:ext cx="7878271" cy="3905712"/>
+          </a:xfrm>
+        </p:spPr>
+        <p:txBody>
+          <a:bodyPr>
+            <a:normAutofit fontScale="92500" lnSpcReduction="10000"/>
+          </a:bodyPr>
+          <a:lstStyle/>
+          <a:p>
+            <a:r>
+              <a:rPr lang="fr-FR" dirty="0" smtClean="0"/>
+              <a:t>Display </a:t>
+            </a:r>
+            <a:r>
+              <a:rPr lang="fr-FR" dirty="0"/>
+              <a:t>Help </a:t>
+            </a:r>
+          </a:p>
+          <a:p>
+            <a:pPr marL="0" indent="0">
+              <a:buNone/>
+            </a:pPr>
+            <a:r>
+              <a:rPr lang="fr-FR" dirty="0"/>
+              <a:t>	</a:t>
+            </a:r>
+            <a:r>
+              <a:rPr lang="en-US" b="1" dirty="0"/>
+              <a:t>if [[ $# == 1 ]] ; then </a:t>
+            </a:r>
+          </a:p>
+          <a:p>
+            <a:pPr marL="0" indent="0">
+              <a:buNone/>
+            </a:pPr>
+            <a:r>
+              <a:rPr lang="en-US" b="1" dirty="0"/>
+              <a:t>		if [[ $1 == '-h' || $1 == '--help' ]] ; then</a:t>
+            </a:r>
+          </a:p>
+          <a:p>
+            <a:pPr marL="0" indent="0">
+              <a:buNone/>
+            </a:pPr>
+            <a:r>
+              <a:rPr lang="en-US" b="1" dirty="0"/>
+              <a:t>		    </a:t>
+            </a:r>
+            <a:r>
+              <a:rPr lang="en-US" b="1" dirty="0" err="1"/>
+              <a:t>help_function</a:t>
+            </a:r>
+            <a:endParaRPr lang="en-US" b="1" dirty="0"/>
+          </a:p>
+          <a:p>
+            <a:pPr marL="0" indent="0">
+              <a:buNone/>
+            </a:pPr>
+            <a:r>
+              <a:rPr lang="fr-FR" b="1" dirty="0" err="1" smtClean="0"/>
+              <a:t>function</a:t>
+            </a:r>
+            <a:r>
+              <a:rPr lang="fr-FR" b="1" dirty="0" smtClean="0"/>
+              <a:t> </a:t>
+            </a:r>
+            <a:r>
+              <a:rPr lang="fr-FR" b="1" dirty="0" err="1"/>
+              <a:t>help_function</a:t>
+            </a:r>
+            <a:r>
+              <a:rPr lang="fr-FR" b="1" dirty="0"/>
+              <a:t> {</a:t>
+            </a:r>
+          </a:p>
+          <a:p>
+            <a:pPr marL="0" indent="0">
+              <a:buNone/>
+            </a:pPr>
+            <a:r>
+              <a:rPr lang="fr-FR" b="1" dirty="0"/>
+              <a:t>	</a:t>
+            </a:r>
+            <a:r>
+              <a:rPr lang="fr-FR" b="1" dirty="0" err="1"/>
+              <a:t>echo</a:t>
+            </a:r>
+            <a:r>
+              <a:rPr lang="fr-FR" b="1" dirty="0"/>
+              <a:t> -e "This application </a:t>
+            </a:r>
+            <a:r>
+              <a:rPr lang="fr-FR" b="1" dirty="0" err="1"/>
+              <a:t>download</a:t>
+            </a:r>
+            <a:r>
+              <a:rPr lang="fr-FR" b="1" dirty="0"/>
+              <a:t> all </a:t>
+            </a:r>
+            <a:r>
+              <a:rPr lang="fr-FR" b="1" dirty="0" err="1"/>
+              <a:t>subtitles</a:t>
+            </a:r>
+            <a:r>
+              <a:rPr lang="fr-FR" b="1" dirty="0"/>
+              <a:t> for the </a:t>
+            </a:r>
+            <a:r>
+              <a:rPr lang="fr-FR" b="1" dirty="0" err="1"/>
+              <a:t>videos</a:t>
+            </a:r>
+            <a:r>
+              <a:rPr lang="fr-FR" b="1" dirty="0"/>
+              <a:t> in a </a:t>
+            </a:r>
+            <a:r>
+              <a:rPr lang="fr-FR" b="1" dirty="0" err="1"/>
+              <a:t>folder</a:t>
+            </a:r>
+            <a:r>
+              <a:rPr lang="fr-FR" b="1" dirty="0"/>
+              <a:t>"</a:t>
+            </a:r>
+          </a:p>
+          <a:p>
+            <a:pPr marL="0" indent="0">
+              <a:buNone/>
+            </a:pPr>
+            <a:r>
+              <a:rPr lang="fr-FR" b="1" dirty="0"/>
+              <a:t>	</a:t>
+            </a:r>
+            <a:r>
+              <a:rPr lang="fr-FR" b="1" dirty="0" err="1"/>
+              <a:t>echo</a:t>
+            </a:r>
+            <a:r>
+              <a:rPr lang="fr-FR" b="1" dirty="0"/>
+              <a:t> -e "Utilisation : ./</a:t>
+            </a:r>
+            <a:r>
+              <a:rPr lang="fr-FR" b="1" dirty="0" err="1"/>
+              <a:t>subtitle.sh</a:t>
+            </a:r>
+            <a:r>
+              <a:rPr lang="fr-FR" b="1" dirty="0"/>
+              <a:t> [</a:t>
+            </a:r>
+            <a:r>
+              <a:rPr lang="fr-FR" b="1" dirty="0" err="1"/>
+              <a:t>language</a:t>
+            </a:r>
+            <a:r>
+              <a:rPr lang="fr-FR" b="1" dirty="0"/>
+              <a:t>] \</a:t>
+            </a:r>
+            <a:r>
+              <a:rPr lang="fr-FR" b="1" dirty="0" smtClean="0"/>
+              <a:t>n</a:t>
+            </a:r>
+            <a:r>
+              <a:rPr lang="fr-FR" b="1" dirty="0"/>
+              <a:t> » {</a:t>
+            </a:r>
+            <a:endParaRPr lang="fr-FR" b="1" dirty="0" smtClean="0"/>
+          </a:p>
+          <a:p>
+            <a:pPr marL="0" indent="0">
+              <a:buNone/>
+            </a:pPr>
+            <a:endParaRPr lang="fr-FR" b="1" dirty="0"/>
+          </a:p>
+        </p:txBody>
+      </p:sp>
+    </p:spTree>
+    <p:extLst>
+      <p:ext uri="{BB962C8B-B14F-4D97-AF65-F5344CB8AC3E}">
+        <p14:creationId xmlns:p14="http://schemas.microsoft.com/office/powerpoint/2010/main" val="1042113773"/>
+      </p:ext>
+    </p:extLst>
+  </p:cSld>
+  <p:clrMapOvr>
+    <a:masterClrMapping/>
+  </p:clrMapOvr>
+</p:sld>
+</file>
+
+<file path=ppt/slides/slide5.xml><?xml version="1.0" encoding="utf-8"?>
+<p:sld xmlns:a="http://schemas.openxmlformats.org/drawingml/2006/main" xmlns:r="http://schemas.openxmlformats.org/officeDocument/2006/relationships" xmlns:p="http://schemas.openxmlformats.org/presentationml/2006/main">
+  <p:cSld>
+    <p:spTree>
+      <p:nvGrpSpPr>
+        <p:cNvPr id="1" name=""/>
+        <p:cNvGrpSpPr/>
+        <p:nvPr/>
+      </p:nvGrpSpPr>
+      <p:grpSpPr>
+        <a:xfrm>
+          <a:off x="0" y="0"/>
+          <a:ext cx="0" cy="0"/>
+          <a:chOff x="0" y="0"/>
+          <a:chExt cx="0" cy="0"/>
+        </a:xfrm>
+      </p:grpSpPr>
+      <p:sp>
+        <p:nvSpPr>
+          <p:cNvPr id="2" name="Titre 1"/>
+          <p:cNvSpPr>
+            <a:spLocks noGrp="1"/>
+          </p:cNvSpPr>
+          <p:nvPr>
+            <p:ph type="title"/>
+          </p:nvPr>
+        </p:nvSpPr>
+        <p:spPr/>
+        <p:txBody>
+          <a:bodyPr/>
+          <a:lstStyle/>
+          <a:p>
+            <a:r>
               <a:rPr lang="fr-FR" dirty="0" smtClean="0"/>
               <a:t>To do </a:t>
             </a:r>
@@ -5536,31 +5961,36 @@
           <a:p>
             <a:r>
               <a:rPr lang="fr-FR" dirty="0" smtClean="0"/>
-              <a:t>Look on the </a:t>
-            </a:r>
-            <a:r>
-              <a:rPr lang="fr-FR" dirty="0" err="1" smtClean="0"/>
-              <a:t>subtitle</a:t>
+              <a:t>Look for </a:t>
             </a:r>
             <a:r>
               <a:rPr lang="fr-FR" dirty="0" smtClean="0"/>
-              <a:t> site for the </a:t>
-            </a:r>
-            <a:r>
-              <a:rPr lang="fr-FR" dirty="0" err="1" smtClean="0"/>
-              <a:t>available</a:t>
-            </a:r>
-            <a:r>
-              <a:rPr lang="fr-FR" dirty="0" smtClean="0"/>
-              <a:t> </a:t>
+              <a:t>the default </a:t>
             </a:r>
             <a:r>
               <a:rPr lang="fr-FR" dirty="0" err="1" smtClean="0"/>
               <a:t>language</a:t>
             </a:r>
-            <a:endParaRPr lang="fr-FR" dirty="0" smtClean="0"/>
-          </a:p>
-          <a:p>
+            <a:r>
+              <a:rPr lang="fr-FR" dirty="0" smtClean="0"/>
+              <a:t> of the computer and insert </a:t>
+            </a:r>
+            <a:r>
+              <a:rPr lang="fr-FR" dirty="0" err="1" smtClean="0"/>
+              <a:t>it</a:t>
+            </a:r>
+            <a:r>
+              <a:rPr lang="fr-FR" dirty="0" smtClean="0"/>
+              <a:t> in the default </a:t>
+            </a:r>
+            <a:r>
+              <a:rPr lang="fr-FR" dirty="0" err="1" smtClean="0"/>
+              <a:t>language</a:t>
+            </a:r>
+            <a:r>
+              <a:rPr lang="fr-FR" dirty="0" smtClean="0"/>
+              <a:t> of the script</a:t>
+            </a:r>
             <a:endParaRPr lang="fr-FR" dirty="0"/>
           </a:p>
         </p:txBody>

</xml_diff>